<commit_message>
MAJ Gilles + Entraxes
</commit_message>
<xml_diff>
--- a/06_CinematiquePoint/Cours/png/Figures.pptx
+++ b/06_CinematiquePoint/Cours/png/Figures.pptx
@@ -8,6 +8,7 @@
     <p:sldId id="256" r:id="rId2"/>
     <p:sldId id="257" r:id="rId3"/>
     <p:sldId id="258" r:id="rId4"/>
+    <p:sldId id="259" r:id="rId5"/>
   </p:sldIdLst>
   <p:sldSz cx="9144000" cy="6858000" type="screen4x3"/>
   <p:notesSz cx="6858000" cy="9144000"/>
@@ -290,7 +291,7 @@
           <a:p>
             <a:fld id="{AA309A6D-C09C-4548-B29A-6CF363A7E532}" type="datetimeFigureOut">
               <a:rPr lang="fr-FR" smtClean="0"/>
-              <a:t>20/12/2013</a:t>
+              <a:t>22/12/2013</a:t>
             </a:fld>
             <a:endParaRPr lang="fr-BE"/>
           </a:p>
@@ -455,7 +456,7 @@
           <a:p>
             <a:fld id="{AA309A6D-C09C-4548-B29A-6CF363A7E532}" type="datetimeFigureOut">
               <a:rPr lang="fr-FR" smtClean="0"/>
-              <a:t>20/12/2013</a:t>
+              <a:t>22/12/2013</a:t>
             </a:fld>
             <a:endParaRPr lang="fr-BE"/>
           </a:p>
@@ -630,7 +631,7 @@
           <a:p>
             <a:fld id="{AA309A6D-C09C-4548-B29A-6CF363A7E532}" type="datetimeFigureOut">
               <a:rPr lang="fr-FR" smtClean="0"/>
-              <a:t>20/12/2013</a:t>
+              <a:t>22/12/2013</a:t>
             </a:fld>
             <a:endParaRPr lang="fr-BE"/>
           </a:p>
@@ -795,7 +796,7 @@
           <a:p>
             <a:fld id="{AA309A6D-C09C-4548-B29A-6CF363A7E532}" type="datetimeFigureOut">
               <a:rPr lang="fr-FR" smtClean="0"/>
-              <a:t>20/12/2013</a:t>
+              <a:t>22/12/2013</a:t>
             </a:fld>
             <a:endParaRPr lang="fr-BE"/>
           </a:p>
@@ -1036,7 +1037,7 @@
           <a:p>
             <a:fld id="{AA309A6D-C09C-4548-B29A-6CF363A7E532}" type="datetimeFigureOut">
               <a:rPr lang="fr-FR" smtClean="0"/>
-              <a:t>20/12/2013</a:t>
+              <a:t>22/12/2013</a:t>
             </a:fld>
             <a:endParaRPr lang="fr-BE"/>
           </a:p>
@@ -1319,7 +1320,7 @@
           <a:p>
             <a:fld id="{AA309A6D-C09C-4548-B29A-6CF363A7E532}" type="datetimeFigureOut">
               <a:rPr lang="fr-FR" smtClean="0"/>
-              <a:t>20/12/2013</a:t>
+              <a:t>22/12/2013</a:t>
             </a:fld>
             <a:endParaRPr lang="fr-BE"/>
           </a:p>
@@ -1736,7 +1737,7 @@
           <a:p>
             <a:fld id="{AA309A6D-C09C-4548-B29A-6CF363A7E532}" type="datetimeFigureOut">
               <a:rPr lang="fr-FR" smtClean="0"/>
-              <a:t>20/12/2013</a:t>
+              <a:t>22/12/2013</a:t>
             </a:fld>
             <a:endParaRPr lang="fr-BE"/>
           </a:p>
@@ -1849,7 +1850,7 @@
           <a:p>
             <a:fld id="{AA309A6D-C09C-4548-B29A-6CF363A7E532}" type="datetimeFigureOut">
               <a:rPr lang="fr-FR" smtClean="0"/>
-              <a:t>20/12/2013</a:t>
+              <a:t>22/12/2013</a:t>
             </a:fld>
             <a:endParaRPr lang="fr-BE"/>
           </a:p>
@@ -1939,7 +1940,7 @@
           <a:p>
             <a:fld id="{AA309A6D-C09C-4548-B29A-6CF363A7E532}" type="datetimeFigureOut">
               <a:rPr lang="fr-FR" smtClean="0"/>
-              <a:t>20/12/2013</a:t>
+              <a:t>22/12/2013</a:t>
             </a:fld>
             <a:endParaRPr lang="fr-BE"/>
           </a:p>
@@ -2211,7 +2212,7 @@
           <a:p>
             <a:fld id="{AA309A6D-C09C-4548-B29A-6CF363A7E532}" type="datetimeFigureOut">
               <a:rPr lang="fr-FR" smtClean="0"/>
-              <a:t>20/12/2013</a:t>
+              <a:t>22/12/2013</a:t>
             </a:fld>
             <a:endParaRPr lang="fr-BE"/>
           </a:p>
@@ -2459,7 +2460,7 @@
           <a:p>
             <a:fld id="{AA309A6D-C09C-4548-B29A-6CF363A7E532}" type="datetimeFigureOut">
               <a:rPr lang="fr-FR" smtClean="0"/>
-              <a:t>20/12/2013</a:t>
+              <a:t>22/12/2013</a:t>
             </a:fld>
             <a:endParaRPr lang="fr-BE"/>
           </a:p>
@@ -2667,7 +2668,7 @@
           <a:p>
             <a:fld id="{AA309A6D-C09C-4548-B29A-6CF363A7E532}" type="datetimeFigureOut">
               <a:rPr lang="fr-FR" smtClean="0"/>
-              <a:t>20/12/2013</a:t>
+              <a:t>22/12/2013</a:t>
             </a:fld>
             <a:endParaRPr lang="fr-BE"/>
           </a:p>
@@ -11814,8 +11815,8 @@
             </p:style>
           </p:cxnSp>
         </p:grpSp>
-        <mc:AlternateContent xmlns:mc="http://schemas.openxmlformats.org/markup-compatibility/2006">
-          <mc:Choice xmlns:a14="http://schemas.microsoft.com/office/drawing/2010/main" Requires="a14">
+        <mc:AlternateContent xmlns:mc="http://schemas.openxmlformats.org/markup-compatibility/2006" xmlns:a14="http://schemas.microsoft.com/office/drawing/2010/main">
+          <mc:Choice Requires="a14">
             <p:sp>
               <p:nvSpPr>
                 <p:cNvPr id="20" name="ZoneTexte 19"/>
@@ -11890,7 +11891,7 @@
               </p:txBody>
             </p:sp>
           </mc:Choice>
-          <mc:Fallback>
+          <mc:Fallback xmlns="">
             <p:sp>
               <p:nvSpPr>
                 <p:cNvPr id="20" name="ZoneTexte 19"/>
@@ -12131,8 +12132,8 @@
             </p:style>
           </p:cxnSp>
         </p:grpSp>
-        <mc:AlternateContent xmlns:mc="http://schemas.openxmlformats.org/markup-compatibility/2006">
-          <mc:Choice xmlns:a14="http://schemas.microsoft.com/office/drawing/2010/main" Requires="a14">
+        <mc:AlternateContent xmlns:mc="http://schemas.openxmlformats.org/markup-compatibility/2006" xmlns:a14="http://schemas.microsoft.com/office/drawing/2010/main">
+          <mc:Choice Requires="a14">
             <p:sp>
               <p:nvSpPr>
                 <p:cNvPr id="23" name="ZoneTexte 22"/>
@@ -12207,7 +12208,7 @@
               </p:txBody>
             </p:sp>
           </mc:Choice>
-          <mc:Fallback>
+          <mc:Fallback xmlns="">
             <p:sp>
               <p:nvSpPr>
                 <p:cNvPr id="23" name="ZoneTexte 22"/>
@@ -12744,8 +12745,8 @@
             </p:style>
           </p:cxnSp>
         </p:grpSp>
-        <mc:AlternateContent xmlns:mc="http://schemas.openxmlformats.org/markup-compatibility/2006">
-          <mc:Choice xmlns:a14="http://schemas.microsoft.com/office/drawing/2010/main" Requires="a14">
+        <mc:AlternateContent xmlns:mc="http://schemas.openxmlformats.org/markup-compatibility/2006" xmlns:a14="http://schemas.microsoft.com/office/drawing/2010/main">
+          <mc:Choice Requires="a14">
             <p:sp>
               <p:nvSpPr>
                 <p:cNvPr id="34" name="ZoneTexte 33"/>
@@ -12820,7 +12821,7 @@
               </p:txBody>
             </p:sp>
           </mc:Choice>
-          <mc:Fallback>
+          <mc:Fallback xmlns="">
             <p:sp>
               <p:nvSpPr>
                 <p:cNvPr id="34" name="ZoneTexte 33"/>
@@ -12859,8 +12860,8 @@
             </p:sp>
           </mc:Fallback>
         </mc:AlternateContent>
-        <mc:AlternateContent xmlns:mc="http://schemas.openxmlformats.org/markup-compatibility/2006">
-          <mc:Choice xmlns:a14="http://schemas.microsoft.com/office/drawing/2010/main" Requires="a14">
+        <mc:AlternateContent xmlns:mc="http://schemas.openxmlformats.org/markup-compatibility/2006" xmlns:a14="http://schemas.microsoft.com/office/drawing/2010/main">
+          <mc:Choice Requires="a14">
             <p:sp>
               <p:nvSpPr>
                 <p:cNvPr id="35" name="ZoneTexte 34"/>
@@ -12935,7 +12936,7 @@
               </p:txBody>
             </p:sp>
           </mc:Choice>
-          <mc:Fallback>
+          <mc:Fallback xmlns="">
             <p:sp>
               <p:nvSpPr>
                 <p:cNvPr id="35" name="ZoneTexte 34"/>
@@ -13061,8 +13062,8 @@
             </p:style>
           </p:cxnSp>
         </p:grpSp>
-        <mc:AlternateContent xmlns:mc="http://schemas.openxmlformats.org/markup-compatibility/2006">
-          <mc:Choice xmlns:a14="http://schemas.microsoft.com/office/drawing/2010/main" Requires="a14">
+        <mc:AlternateContent xmlns:mc="http://schemas.openxmlformats.org/markup-compatibility/2006" xmlns:a14="http://schemas.microsoft.com/office/drawing/2010/main">
+          <mc:Choice Requires="a14">
             <p:sp>
               <p:nvSpPr>
                 <p:cNvPr id="37" name="ZoneTexte 36"/>
@@ -13137,7 +13138,7 @@
               </p:txBody>
             </p:sp>
           </mc:Choice>
-          <mc:Fallback>
+          <mc:Fallback xmlns="">
             <p:sp>
               <p:nvSpPr>
                 <p:cNvPr id="37" name="ZoneTexte 36"/>
@@ -13291,8 +13292,8 @@
             </p:sp>
           </mc:Fallback>
         </mc:AlternateContent>
-        <mc:AlternateContent xmlns:mc="http://schemas.openxmlformats.org/markup-compatibility/2006">
-          <mc:Choice xmlns:a14="http://schemas.microsoft.com/office/drawing/2010/main" Requires="a14">
+        <mc:AlternateContent xmlns:mc="http://schemas.openxmlformats.org/markup-compatibility/2006" xmlns:a14="http://schemas.microsoft.com/office/drawing/2010/main">
+          <mc:Choice Requires="a14">
             <p:sp>
               <p:nvSpPr>
                 <p:cNvPr id="39" name="ZoneTexte 38"/>
@@ -13367,7 +13368,7 @@
               </p:txBody>
             </p:sp>
           </mc:Choice>
-          <mc:Fallback>
+          <mc:Fallback xmlns="">
             <p:sp>
               <p:nvSpPr>
                 <p:cNvPr id="39" name="ZoneTexte 38"/>
@@ -13577,6 +13578,2267 @@
     <p:extLst>
       <p:ext uri="{BB962C8B-B14F-4D97-AF65-F5344CB8AC3E}">
         <p14:creationId xmlns:p14="http://schemas.microsoft.com/office/powerpoint/2010/main" val="2887764530"/>
+      </p:ext>
+    </p:extLst>
+  </p:cSld>
+  <p:clrMapOvr>
+    <a:masterClrMapping/>
+  </p:clrMapOvr>
+</p:sld>
+</file>
+
+<file path=ppt/slides/slide4.xml><?xml version="1.0" encoding="utf-8"?>
+<p:sld xmlns:a="http://schemas.openxmlformats.org/drawingml/2006/main" xmlns:r="http://schemas.openxmlformats.org/officeDocument/2006/relationships" xmlns:p="http://schemas.openxmlformats.org/presentationml/2006/main">
+  <p:cSld>
+    <p:spTree>
+      <p:nvGrpSpPr>
+        <p:cNvPr id="1" name=""/>
+        <p:cNvGrpSpPr/>
+        <p:nvPr/>
+      </p:nvGrpSpPr>
+      <p:grpSpPr>
+        <a:xfrm>
+          <a:off x="0" y="0"/>
+          <a:ext cx="0" cy="0"/>
+          <a:chOff x="0" y="0"/>
+          <a:chExt cx="0" cy="0"/>
+        </a:xfrm>
+      </p:grpSpPr>
+      <p:sp>
+        <p:nvSpPr>
+          <p:cNvPr id="2" name="Titre 1"/>
+          <p:cNvSpPr>
+            <a:spLocks noGrp="1"/>
+          </p:cNvSpPr>
+          <p:nvPr>
+            <p:ph type="title"/>
+          </p:nvPr>
+        </p:nvSpPr>
+        <p:spPr/>
+        <p:txBody>
+          <a:bodyPr/>
+          <a:lstStyle/>
+          <a:p>
+            <a:endParaRPr lang="fr-FR"/>
+          </a:p>
+        </p:txBody>
+      </p:sp>
+      <mc:AlternateContent xmlns:mc="http://schemas.openxmlformats.org/markup-compatibility/2006">
+        <mc:Choice xmlns:a14="http://schemas.microsoft.com/office/drawing/2010/main" Requires="a14">
+          <p:sp>
+            <p:nvSpPr>
+              <p:cNvPr id="4" name="ZoneTexte 3"/>
+              <p:cNvSpPr txBox="1"/>
+              <p:nvPr/>
+            </p:nvSpPr>
+            <p:spPr>
+              <a:xfrm>
+                <a:off x="2204773" y="2765786"/>
+                <a:ext cx="901158" cy="430887"/>
+              </a:xfrm>
+              <a:prstGeom prst="rect">
+                <a:avLst/>
+              </a:prstGeom>
+              <a:noFill/>
+            </p:spPr>
+            <p:txBody>
+              <a:bodyPr wrap="square" rtlCol="0">
+                <a:spAutoFit/>
+              </a:bodyPr>
+              <a:lstStyle/>
+              <a:p>
+                <a:r>
+                  <a:rPr lang="fr-FR" sz="1100" dirty="0" smtClean="0"/>
+                  <a:t>Pivot d’axe </a:t>
+                </a:r>
+                <a14:m>
+                  <m:oMath xmlns:m="http://schemas.openxmlformats.org/officeDocument/2006/math">
+                    <m:d>
+                      <m:dPr>
+                        <m:ctrlPr>
+                          <a:rPr lang="fr-FR" sz="1100" i="1" smtClean="0">
+                            <a:latin typeface="Cambria Math"/>
+                          </a:rPr>
+                        </m:ctrlPr>
+                      </m:dPr>
+                      <m:e>
+                        <m:r>
+                          <a:rPr lang="fr-FR" sz="1100" b="0" i="1" smtClean="0">
+                            <a:latin typeface="Cambria Math"/>
+                          </a:rPr>
+                          <m:t>𝐴</m:t>
+                        </m:r>
+                        <m:r>
+                          <a:rPr lang="fr-FR" sz="1100" b="0" i="1" smtClean="0">
+                            <a:latin typeface="Cambria Math"/>
+                          </a:rPr>
+                          <m:t>,</m:t>
+                        </m:r>
+                        <m:acc>
+                          <m:accPr>
+                            <m:chr m:val="⃗"/>
+                            <m:ctrlPr>
+                              <a:rPr lang="fr-FR" sz="1100" b="0" i="1" smtClean="0">
+                                <a:latin typeface="Cambria Math"/>
+                              </a:rPr>
+                            </m:ctrlPr>
+                          </m:accPr>
+                          <m:e>
+                            <m:r>
+                              <a:rPr lang="fr-FR" sz="1100" b="0" i="1" smtClean="0">
+                                <a:latin typeface="Cambria Math"/>
+                              </a:rPr>
+                              <m:t>𝑧</m:t>
+                            </m:r>
+                          </m:e>
+                        </m:acc>
+                      </m:e>
+                    </m:d>
+                  </m:oMath>
+                </a14:m>
+                <a:endParaRPr lang="fr-FR" sz="1100" dirty="0"/>
+              </a:p>
+            </p:txBody>
+          </p:sp>
+        </mc:Choice>
+        <mc:Fallback>
+          <p:sp>
+            <p:nvSpPr>
+              <p:cNvPr id="4" name="ZoneTexte 3"/>
+              <p:cNvSpPr txBox="1">
+                <a:spLocks noRot="1" noChangeAspect="1" noMove="1" noResize="1" noEditPoints="1" noAdjustHandles="1" noChangeArrowheads="1" noChangeShapeType="1" noTextEdit="1"/>
+              </p:cNvSpPr>
+              <p:nvPr/>
+            </p:nvSpPr>
+            <p:spPr>
+              <a:xfrm>
+                <a:off x="2204773" y="2765786"/>
+                <a:ext cx="901158" cy="430887"/>
+              </a:xfrm>
+              <a:prstGeom prst="rect">
+                <a:avLst/>
+              </a:prstGeom>
+              <a:blipFill rotWithShape="1">
+                <a:blip r:embed="rId2"/>
+                <a:stretch>
+                  <a:fillRect t="-1429"/>
+                </a:stretch>
+              </a:blipFill>
+            </p:spPr>
+            <p:txBody>
+              <a:bodyPr/>
+              <a:lstStyle/>
+              <a:p>
+                <a:r>
+                  <a:rPr lang="fr-FR">
+                    <a:noFill/>
+                  </a:rPr>
+                  <a:t> </a:t>
+                </a:r>
+              </a:p>
+            </p:txBody>
+          </p:sp>
+        </mc:Fallback>
+      </mc:AlternateContent>
+      <p:grpSp>
+        <p:nvGrpSpPr>
+          <p:cNvPr id="5" name="Groupe 4"/>
+          <p:cNvGrpSpPr/>
+          <p:nvPr/>
+        </p:nvGrpSpPr>
+        <p:grpSpPr>
+          <a:xfrm>
+            <a:off x="1048678" y="2801230"/>
+            <a:ext cx="2023572" cy="1342965"/>
+            <a:chOff x="26574" y="4030235"/>
+            <a:chExt cx="2023572" cy="1342965"/>
+          </a:xfrm>
+        </p:grpSpPr>
+        <p:sp>
+          <p:nvSpPr>
+            <p:cNvPr id="6" name="Ellipse 5"/>
+            <p:cNvSpPr/>
+            <p:nvPr/>
+          </p:nvSpPr>
+          <p:spPr>
+            <a:xfrm>
+              <a:off x="845461" y="4030235"/>
+              <a:ext cx="180000" cy="180000"/>
+            </a:xfrm>
+            <a:prstGeom prst="ellipse">
+              <a:avLst/>
+            </a:prstGeom>
+            <a:noFill/>
+            <a:ln w="12700">
+              <a:solidFill>
+                <a:srgbClr val="7030A0"/>
+              </a:solidFill>
+            </a:ln>
+          </p:spPr>
+          <p:style>
+            <a:lnRef idx="2">
+              <a:schemeClr val="accent1">
+                <a:shade val="50000"/>
+              </a:schemeClr>
+            </a:lnRef>
+            <a:fillRef idx="1">
+              <a:schemeClr val="accent1"/>
+            </a:fillRef>
+            <a:effectRef idx="0">
+              <a:schemeClr val="accent1"/>
+            </a:effectRef>
+            <a:fontRef idx="minor">
+              <a:schemeClr val="lt1"/>
+            </a:fontRef>
+          </p:style>
+          <p:txBody>
+            <a:bodyPr rtlCol="0" anchor="ctr"/>
+            <a:lstStyle/>
+            <a:p>
+              <a:pPr algn="ctr"/>
+              <a:r>
+                <a:rPr lang="fr-FR" sz="1100" dirty="0">
+                  <a:solidFill>
+                    <a:srgbClr val="7030A0"/>
+                  </a:solidFill>
+                </a:rPr>
+                <a:t>2</a:t>
+              </a:r>
+            </a:p>
+          </p:txBody>
+        </p:sp>
+        <p:sp>
+          <p:nvSpPr>
+            <p:cNvPr id="7" name="Ellipse 6"/>
+            <p:cNvSpPr/>
+            <p:nvPr/>
+          </p:nvSpPr>
+          <p:spPr>
+            <a:xfrm>
+              <a:off x="297153" y="4491128"/>
+              <a:ext cx="180000" cy="180000"/>
+            </a:xfrm>
+            <a:prstGeom prst="ellipse">
+              <a:avLst/>
+            </a:prstGeom>
+            <a:noFill/>
+            <a:ln w="12700">
+              <a:solidFill>
+                <a:srgbClr val="00B050"/>
+              </a:solidFill>
+            </a:ln>
+          </p:spPr>
+          <p:style>
+            <a:lnRef idx="2">
+              <a:schemeClr val="accent1">
+                <a:shade val="50000"/>
+              </a:schemeClr>
+            </a:lnRef>
+            <a:fillRef idx="1">
+              <a:schemeClr val="accent1"/>
+            </a:fillRef>
+            <a:effectRef idx="0">
+              <a:schemeClr val="accent1"/>
+            </a:effectRef>
+            <a:fontRef idx="minor">
+              <a:schemeClr val="lt1"/>
+            </a:fontRef>
+          </p:style>
+          <p:txBody>
+            <a:bodyPr rtlCol="0" anchor="ctr"/>
+            <a:lstStyle/>
+            <a:p>
+              <a:pPr algn="ctr"/>
+              <a:r>
+                <a:rPr lang="fr-FR" sz="1100" dirty="0" smtClean="0">
+                  <a:solidFill>
+                    <a:srgbClr val="00B050"/>
+                  </a:solidFill>
+                </a:rPr>
+                <a:t>1</a:t>
+              </a:r>
+              <a:endParaRPr lang="fr-FR" sz="1100" dirty="0">
+                <a:solidFill>
+                  <a:srgbClr val="00B050"/>
+                </a:solidFill>
+              </a:endParaRPr>
+            </a:p>
+          </p:txBody>
+        </p:sp>
+        <p:sp>
+          <p:nvSpPr>
+            <p:cNvPr id="8" name="Ellipse 7"/>
+            <p:cNvSpPr/>
+            <p:nvPr/>
+          </p:nvSpPr>
+          <p:spPr>
+            <a:xfrm>
+              <a:off x="1419567" y="4491128"/>
+              <a:ext cx="180000" cy="180000"/>
+            </a:xfrm>
+            <a:prstGeom prst="ellipse">
+              <a:avLst/>
+            </a:prstGeom>
+            <a:noFill/>
+            <a:ln w="12700">
+              <a:solidFill>
+                <a:srgbClr val="0070C0"/>
+              </a:solidFill>
+            </a:ln>
+          </p:spPr>
+          <p:style>
+            <a:lnRef idx="2">
+              <a:schemeClr val="accent1">
+                <a:shade val="50000"/>
+              </a:schemeClr>
+            </a:lnRef>
+            <a:fillRef idx="1">
+              <a:schemeClr val="accent1"/>
+            </a:fillRef>
+            <a:effectRef idx="0">
+              <a:schemeClr val="accent1"/>
+            </a:effectRef>
+            <a:fontRef idx="minor">
+              <a:schemeClr val="lt1"/>
+            </a:fontRef>
+          </p:style>
+          <p:txBody>
+            <a:bodyPr rtlCol="0" anchor="ctr"/>
+            <a:lstStyle/>
+            <a:p>
+              <a:pPr algn="ctr"/>
+              <a:r>
+                <a:rPr lang="fr-FR" sz="1100" dirty="0">
+                  <a:solidFill>
+                    <a:srgbClr val="0070C0"/>
+                  </a:solidFill>
+                </a:rPr>
+                <a:t>3</a:t>
+              </a:r>
+            </a:p>
+          </p:txBody>
+        </p:sp>
+        <p:sp>
+          <p:nvSpPr>
+            <p:cNvPr id="9" name="Ellipse 8"/>
+            <p:cNvSpPr/>
+            <p:nvPr/>
+          </p:nvSpPr>
+          <p:spPr>
+            <a:xfrm>
+              <a:off x="845576" y="4943947"/>
+              <a:ext cx="180000" cy="180000"/>
+            </a:xfrm>
+            <a:prstGeom prst="ellipse">
+              <a:avLst/>
+            </a:prstGeom>
+            <a:noFill/>
+            <a:ln w="12700">
+              <a:solidFill>
+                <a:schemeClr val="tx1"/>
+              </a:solidFill>
+            </a:ln>
+          </p:spPr>
+          <p:style>
+            <a:lnRef idx="2">
+              <a:schemeClr val="accent1">
+                <a:shade val="50000"/>
+              </a:schemeClr>
+            </a:lnRef>
+            <a:fillRef idx="1">
+              <a:schemeClr val="accent1"/>
+            </a:fillRef>
+            <a:effectRef idx="0">
+              <a:schemeClr val="accent1"/>
+            </a:effectRef>
+            <a:fontRef idx="minor">
+              <a:schemeClr val="lt1"/>
+            </a:fontRef>
+          </p:style>
+          <p:txBody>
+            <a:bodyPr rtlCol="0" anchor="ctr"/>
+            <a:lstStyle/>
+            <a:p>
+              <a:pPr algn="ctr"/>
+              <a:r>
+                <a:rPr lang="fr-FR" sz="1100" dirty="0">
+                  <a:solidFill>
+                    <a:schemeClr val="tx1"/>
+                  </a:solidFill>
+                </a:rPr>
+                <a:t>0</a:t>
+              </a:r>
+            </a:p>
+          </p:txBody>
+        </p:sp>
+        <p:sp>
+          <p:nvSpPr>
+            <p:cNvPr id="10" name="Rectangle 9"/>
+            <p:cNvSpPr/>
+            <p:nvPr/>
+          </p:nvSpPr>
+          <p:spPr>
+            <a:xfrm rot="5400000">
+              <a:off x="881576" y="5211200"/>
+              <a:ext cx="108000" cy="216000"/>
+            </a:xfrm>
+            <a:prstGeom prst="rect">
+              <a:avLst/>
+            </a:prstGeom>
+            <a:pattFill prst="dkUpDiag">
+              <a:fgClr>
+                <a:schemeClr val="tx1"/>
+              </a:fgClr>
+              <a:bgClr>
+                <a:schemeClr val="bg1"/>
+              </a:bgClr>
+            </a:pattFill>
+            <a:ln w="28575">
+              <a:noFill/>
+            </a:ln>
+          </p:spPr>
+          <p:style>
+            <a:lnRef idx="2">
+              <a:schemeClr val="accent1">
+                <a:shade val="50000"/>
+              </a:schemeClr>
+            </a:lnRef>
+            <a:fillRef idx="1">
+              <a:schemeClr val="accent1"/>
+            </a:fillRef>
+            <a:effectRef idx="0">
+              <a:schemeClr val="accent1"/>
+            </a:effectRef>
+            <a:fontRef idx="minor">
+              <a:schemeClr val="lt1"/>
+            </a:fontRef>
+          </p:style>
+          <p:txBody>
+            <a:bodyPr rtlCol="0" anchor="ctr"/>
+            <a:lstStyle/>
+            <a:p>
+              <a:pPr algn="ctr"/>
+              <a:endParaRPr lang="fr-FR"/>
+            </a:p>
+          </p:txBody>
+        </p:sp>
+        <p:cxnSp>
+          <p:nvCxnSpPr>
+            <p:cNvPr id="11" name="Connecteur droit 10"/>
+            <p:cNvCxnSpPr/>
+            <p:nvPr/>
+          </p:nvCxnSpPr>
+          <p:spPr>
+            <a:xfrm>
+              <a:off x="827461" y="5271459"/>
+              <a:ext cx="216000" cy="0"/>
+            </a:xfrm>
+            <a:prstGeom prst="line">
+              <a:avLst/>
+            </a:prstGeom>
+            <a:ln w="19050">
+              <a:solidFill>
+                <a:schemeClr val="tx1"/>
+              </a:solidFill>
+            </a:ln>
+          </p:spPr>
+          <p:style>
+            <a:lnRef idx="1">
+              <a:schemeClr val="accent1"/>
+            </a:lnRef>
+            <a:fillRef idx="0">
+              <a:schemeClr val="accent1"/>
+            </a:fillRef>
+            <a:effectRef idx="0">
+              <a:schemeClr val="accent1"/>
+            </a:effectRef>
+            <a:fontRef idx="minor">
+              <a:schemeClr val="tx1"/>
+            </a:fontRef>
+          </p:style>
+        </p:cxnSp>
+        <p:cxnSp>
+          <p:nvCxnSpPr>
+            <p:cNvPr id="12" name="Connecteur droit 11"/>
+            <p:cNvCxnSpPr/>
+            <p:nvPr/>
+          </p:nvCxnSpPr>
+          <p:spPr>
+            <a:xfrm>
+              <a:off x="935461" y="5127443"/>
+              <a:ext cx="0" cy="144016"/>
+            </a:xfrm>
+            <a:prstGeom prst="line">
+              <a:avLst/>
+            </a:prstGeom>
+            <a:ln w="19050">
+              <a:solidFill>
+                <a:schemeClr val="tx1"/>
+              </a:solidFill>
+            </a:ln>
+          </p:spPr>
+          <p:style>
+            <a:lnRef idx="1">
+              <a:schemeClr val="accent1"/>
+            </a:lnRef>
+            <a:fillRef idx="0">
+              <a:schemeClr val="accent1"/>
+            </a:fillRef>
+            <a:effectRef idx="0">
+              <a:schemeClr val="accent1"/>
+            </a:effectRef>
+            <a:fontRef idx="minor">
+              <a:schemeClr val="tx1"/>
+            </a:fontRef>
+          </p:style>
+        </p:cxnSp>
+        <p:cxnSp>
+          <p:nvCxnSpPr>
+            <p:cNvPr id="13" name="Connecteur droit 12"/>
+            <p:cNvCxnSpPr>
+              <a:stCxn id="9" idx="1"/>
+              <a:endCxn id="7" idx="5"/>
+            </p:cNvCxnSpPr>
+            <p:nvPr/>
+          </p:nvCxnSpPr>
+          <p:spPr>
+            <a:xfrm flipH="1" flipV="1">
+              <a:off x="450793" y="4644768"/>
+              <a:ext cx="421143" cy="325539"/>
+            </a:xfrm>
+            <a:prstGeom prst="line">
+              <a:avLst/>
+            </a:prstGeom>
+            <a:ln w="19050">
+              <a:solidFill>
+                <a:schemeClr val="tx1"/>
+              </a:solidFill>
+            </a:ln>
+          </p:spPr>
+          <p:style>
+            <a:lnRef idx="1">
+              <a:schemeClr val="accent1"/>
+            </a:lnRef>
+            <a:fillRef idx="0">
+              <a:schemeClr val="accent1"/>
+            </a:fillRef>
+            <a:effectRef idx="0">
+              <a:schemeClr val="accent1"/>
+            </a:effectRef>
+            <a:fontRef idx="minor">
+              <a:schemeClr val="tx1"/>
+            </a:fontRef>
+          </p:style>
+        </p:cxnSp>
+        <p:cxnSp>
+          <p:nvCxnSpPr>
+            <p:cNvPr id="14" name="Connecteur droit 13"/>
+            <p:cNvCxnSpPr>
+              <a:stCxn id="6" idx="3"/>
+              <a:endCxn id="7" idx="7"/>
+            </p:cNvCxnSpPr>
+            <p:nvPr/>
+          </p:nvCxnSpPr>
+          <p:spPr>
+            <a:xfrm flipH="1">
+              <a:off x="450793" y="4183875"/>
+              <a:ext cx="421028" cy="333613"/>
+            </a:xfrm>
+            <a:prstGeom prst="line">
+              <a:avLst/>
+            </a:prstGeom>
+            <a:ln w="19050">
+              <a:solidFill>
+                <a:schemeClr val="tx1"/>
+              </a:solidFill>
+            </a:ln>
+          </p:spPr>
+          <p:style>
+            <a:lnRef idx="1">
+              <a:schemeClr val="accent1"/>
+            </a:lnRef>
+            <a:fillRef idx="0">
+              <a:schemeClr val="accent1"/>
+            </a:fillRef>
+            <a:effectRef idx="0">
+              <a:schemeClr val="accent1"/>
+            </a:effectRef>
+            <a:fontRef idx="minor">
+              <a:schemeClr val="tx1"/>
+            </a:fontRef>
+          </p:style>
+        </p:cxnSp>
+        <p:cxnSp>
+          <p:nvCxnSpPr>
+            <p:cNvPr id="15" name="Connecteur droit 14"/>
+            <p:cNvCxnSpPr>
+              <a:stCxn id="8" idx="3"/>
+              <a:endCxn id="9" idx="7"/>
+            </p:cNvCxnSpPr>
+            <p:nvPr/>
+          </p:nvCxnSpPr>
+          <p:spPr>
+            <a:xfrm flipH="1">
+              <a:off x="999216" y="4644768"/>
+              <a:ext cx="446711" cy="325539"/>
+            </a:xfrm>
+            <a:prstGeom prst="line">
+              <a:avLst/>
+            </a:prstGeom>
+            <a:ln w="19050">
+              <a:solidFill>
+                <a:schemeClr val="tx1"/>
+              </a:solidFill>
+            </a:ln>
+          </p:spPr>
+          <p:style>
+            <a:lnRef idx="1">
+              <a:schemeClr val="accent1"/>
+            </a:lnRef>
+            <a:fillRef idx="0">
+              <a:schemeClr val="accent1"/>
+            </a:fillRef>
+            <a:effectRef idx="0">
+              <a:schemeClr val="accent1"/>
+            </a:effectRef>
+            <a:fontRef idx="minor">
+              <a:schemeClr val="tx1"/>
+            </a:fontRef>
+          </p:style>
+        </p:cxnSp>
+        <p:cxnSp>
+          <p:nvCxnSpPr>
+            <p:cNvPr id="16" name="Connecteur droit 15"/>
+            <p:cNvCxnSpPr>
+              <a:stCxn id="6" idx="5"/>
+              <a:endCxn id="8" idx="1"/>
+            </p:cNvCxnSpPr>
+            <p:nvPr/>
+          </p:nvCxnSpPr>
+          <p:spPr>
+            <a:xfrm>
+              <a:off x="999101" y="4183875"/>
+              <a:ext cx="446826" cy="333613"/>
+            </a:xfrm>
+            <a:prstGeom prst="line">
+              <a:avLst/>
+            </a:prstGeom>
+            <a:ln w="19050">
+              <a:solidFill>
+                <a:schemeClr val="tx1"/>
+              </a:solidFill>
+            </a:ln>
+          </p:spPr>
+          <p:style>
+            <a:lnRef idx="1">
+              <a:schemeClr val="accent1"/>
+            </a:lnRef>
+            <a:fillRef idx="0">
+              <a:schemeClr val="accent1"/>
+            </a:fillRef>
+            <a:effectRef idx="0">
+              <a:schemeClr val="accent1"/>
+            </a:effectRef>
+            <a:fontRef idx="minor">
+              <a:schemeClr val="tx1"/>
+            </a:fontRef>
+          </p:style>
+        </p:cxnSp>
+        <p:cxnSp>
+          <p:nvCxnSpPr>
+            <p:cNvPr id="17" name="Connecteur droit 16"/>
+            <p:cNvCxnSpPr>
+              <a:stCxn id="6" idx="4"/>
+              <a:endCxn id="9" idx="0"/>
+            </p:cNvCxnSpPr>
+            <p:nvPr/>
+          </p:nvCxnSpPr>
+          <p:spPr>
+            <a:xfrm>
+              <a:off x="935461" y="4210235"/>
+              <a:ext cx="115" cy="733712"/>
+            </a:xfrm>
+            <a:prstGeom prst="line">
+              <a:avLst/>
+            </a:prstGeom>
+            <a:ln w="19050">
+              <a:solidFill>
+                <a:schemeClr val="tx1"/>
+              </a:solidFill>
+            </a:ln>
+          </p:spPr>
+          <p:style>
+            <a:lnRef idx="1">
+              <a:schemeClr val="accent1"/>
+            </a:lnRef>
+            <a:fillRef idx="0">
+              <a:schemeClr val="accent1"/>
+            </a:fillRef>
+            <a:effectRef idx="0">
+              <a:schemeClr val="accent1"/>
+            </a:effectRef>
+            <a:fontRef idx="minor">
+              <a:schemeClr val="tx1"/>
+            </a:fontRef>
+          </p:style>
+        </p:cxnSp>
+        <mc:AlternateContent xmlns:mc="http://schemas.openxmlformats.org/markup-compatibility/2006" xmlns:a14="http://schemas.microsoft.com/office/drawing/2010/main">
+          <mc:Choice Requires="a14">
+            <p:sp>
+              <p:nvSpPr>
+                <p:cNvPr id="18" name="ZoneTexte 17"/>
+                <p:cNvSpPr txBox="1"/>
+                <p:nvPr/>
+              </p:nvSpPr>
+              <p:spPr>
+                <a:xfrm>
+                  <a:off x="26574" y="4768564"/>
+                  <a:ext cx="901158" cy="430887"/>
+                </a:xfrm>
+                <a:prstGeom prst="rect">
+                  <a:avLst/>
+                </a:prstGeom>
+                <a:noFill/>
+              </p:spPr>
+              <p:txBody>
+                <a:bodyPr wrap="square" rtlCol="0">
+                  <a:spAutoFit/>
+                </a:bodyPr>
+                <a:lstStyle/>
+                <a:p>
+                  <a:r>
+                    <a:rPr lang="fr-FR" sz="1100" dirty="0" smtClean="0"/>
+                    <a:t>Pivot d’axe </a:t>
+                  </a:r>
+                  <a14:m>
+                    <m:oMath xmlns:m="http://schemas.openxmlformats.org/officeDocument/2006/math">
+                      <m:d>
+                        <m:dPr>
+                          <m:ctrlPr>
+                            <a:rPr lang="fr-FR" sz="1100" i="1" smtClean="0">
+                              <a:latin typeface="Cambria Math"/>
+                            </a:rPr>
+                          </m:ctrlPr>
+                        </m:dPr>
+                        <m:e>
+                          <m:r>
+                            <a:rPr lang="fr-FR" sz="1100" b="0" i="1" smtClean="0">
+                              <a:latin typeface="Cambria Math"/>
+                            </a:rPr>
+                            <m:t>𝑂</m:t>
+                          </m:r>
+                          <m:r>
+                            <a:rPr lang="fr-FR" sz="1100" b="0" i="1" smtClean="0">
+                              <a:latin typeface="Cambria Math"/>
+                            </a:rPr>
+                            <m:t>,</m:t>
+                          </m:r>
+                          <m:acc>
+                            <m:accPr>
+                              <m:chr m:val="⃗"/>
+                              <m:ctrlPr>
+                                <a:rPr lang="fr-FR" sz="1100" b="0" i="1" smtClean="0">
+                                  <a:latin typeface="Cambria Math"/>
+                                </a:rPr>
+                              </m:ctrlPr>
+                            </m:accPr>
+                            <m:e>
+                              <m:r>
+                                <a:rPr lang="fr-FR" sz="1100" b="0" i="1" smtClean="0">
+                                  <a:latin typeface="Cambria Math"/>
+                                </a:rPr>
+                                <m:t>𝑧</m:t>
+                              </m:r>
+                            </m:e>
+                          </m:acc>
+                        </m:e>
+                      </m:d>
+                    </m:oMath>
+                  </a14:m>
+                  <a:endParaRPr lang="fr-FR" sz="1100" dirty="0"/>
+                </a:p>
+              </p:txBody>
+            </p:sp>
+          </mc:Choice>
+          <mc:Fallback xmlns="">
+            <p:sp>
+              <p:nvSpPr>
+                <p:cNvPr id="1054" name="ZoneTexte 1053"/>
+                <p:cNvSpPr txBox="1">
+                  <a:spLocks noRot="1" noChangeAspect="1" noMove="1" noResize="1" noEditPoints="1" noAdjustHandles="1" noChangeArrowheads="1" noChangeShapeType="1" noTextEdit="1"/>
+                </p:cNvSpPr>
+                <p:nvPr/>
+              </p:nvSpPr>
+              <p:spPr>
+                <a:xfrm>
+                  <a:off x="26574" y="4768564"/>
+                  <a:ext cx="901158" cy="430887"/>
+                </a:xfrm>
+                <a:prstGeom prst="rect">
+                  <a:avLst/>
+                </a:prstGeom>
+                <a:blipFill rotWithShape="1">
+                  <a:blip r:embed="rId14"/>
+                  <a:stretch>
+                    <a:fillRect t="-1408"/>
+                  </a:stretch>
+                </a:blipFill>
+              </p:spPr>
+              <p:txBody>
+                <a:bodyPr/>
+                <a:lstStyle/>
+                <a:p>
+                  <a:r>
+                    <a:rPr lang="fr-FR">
+                      <a:noFill/>
+                    </a:rPr>
+                    <a:t> </a:t>
+                  </a:r>
+                </a:p>
+              </p:txBody>
+            </p:sp>
+          </mc:Fallback>
+        </mc:AlternateContent>
+        <mc:AlternateContent xmlns:mc="http://schemas.openxmlformats.org/markup-compatibility/2006" xmlns:a14="http://schemas.microsoft.com/office/drawing/2010/main">
+          <mc:Choice Requires="a14">
+            <p:sp>
+              <p:nvSpPr>
+                <p:cNvPr id="19" name="ZoneTexte 18"/>
+                <p:cNvSpPr txBox="1"/>
+                <p:nvPr/>
+              </p:nvSpPr>
+              <p:spPr>
+                <a:xfrm>
+                  <a:off x="1148988" y="4768564"/>
+                  <a:ext cx="901158" cy="430887"/>
+                </a:xfrm>
+                <a:prstGeom prst="rect">
+                  <a:avLst/>
+                </a:prstGeom>
+                <a:noFill/>
+              </p:spPr>
+              <p:txBody>
+                <a:bodyPr wrap="square" rtlCol="0">
+                  <a:spAutoFit/>
+                </a:bodyPr>
+                <a:lstStyle/>
+                <a:p>
+                  <a:r>
+                    <a:rPr lang="fr-FR" sz="1100" dirty="0" smtClean="0"/>
+                    <a:t>Pivot d’axe </a:t>
+                  </a:r>
+                  <a14:m>
+                    <m:oMath xmlns:m="http://schemas.openxmlformats.org/officeDocument/2006/math">
+                      <m:d>
+                        <m:dPr>
+                          <m:ctrlPr>
+                            <a:rPr lang="fr-FR" sz="1100" i="1" smtClean="0">
+                              <a:latin typeface="Cambria Math"/>
+                            </a:rPr>
+                          </m:ctrlPr>
+                        </m:dPr>
+                        <m:e>
+                          <m:r>
+                            <a:rPr lang="fr-FR" sz="1100" b="0" i="1" smtClean="0">
+                              <a:latin typeface="Cambria Math"/>
+                            </a:rPr>
+                            <m:t>𝑂</m:t>
+                          </m:r>
+                          <m:r>
+                            <a:rPr lang="fr-FR" sz="1100" b="0" i="1" smtClean="0">
+                              <a:latin typeface="Cambria Math"/>
+                            </a:rPr>
+                            <m:t>,</m:t>
+                          </m:r>
+                          <m:acc>
+                            <m:accPr>
+                              <m:chr m:val="⃗"/>
+                              <m:ctrlPr>
+                                <a:rPr lang="fr-FR" sz="1100" b="0" i="1" smtClean="0">
+                                  <a:latin typeface="Cambria Math"/>
+                                </a:rPr>
+                              </m:ctrlPr>
+                            </m:accPr>
+                            <m:e>
+                              <m:r>
+                                <a:rPr lang="fr-FR" sz="1100" b="0" i="1" smtClean="0">
+                                  <a:latin typeface="Cambria Math"/>
+                                </a:rPr>
+                                <m:t>𝑧</m:t>
+                              </m:r>
+                            </m:e>
+                          </m:acc>
+                        </m:e>
+                      </m:d>
+                    </m:oMath>
+                  </a14:m>
+                  <a:endParaRPr lang="fr-FR" sz="1100" dirty="0"/>
+                </a:p>
+              </p:txBody>
+            </p:sp>
+          </mc:Choice>
+          <mc:Fallback xmlns="">
+            <p:sp>
+              <p:nvSpPr>
+                <p:cNvPr id="164" name="ZoneTexte 163"/>
+                <p:cNvSpPr txBox="1">
+                  <a:spLocks noRot="1" noChangeAspect="1" noMove="1" noResize="1" noEditPoints="1" noAdjustHandles="1" noChangeArrowheads="1" noChangeShapeType="1" noTextEdit="1"/>
+                </p:cNvSpPr>
+                <p:nvPr/>
+              </p:nvSpPr>
+              <p:spPr>
+                <a:xfrm>
+                  <a:off x="1148988" y="4768564"/>
+                  <a:ext cx="901158" cy="430887"/>
+                </a:xfrm>
+                <a:prstGeom prst="rect">
+                  <a:avLst/>
+                </a:prstGeom>
+                <a:blipFill rotWithShape="1">
+                  <a:blip r:embed="rId15"/>
+                  <a:stretch>
+                    <a:fillRect t="-1408"/>
+                  </a:stretch>
+                </a:blipFill>
+              </p:spPr>
+              <p:txBody>
+                <a:bodyPr/>
+                <a:lstStyle/>
+                <a:p>
+                  <a:r>
+                    <a:rPr lang="fr-FR">
+                      <a:noFill/>
+                    </a:rPr>
+                    <a:t> </a:t>
+                  </a:r>
+                </a:p>
+              </p:txBody>
+            </p:sp>
+          </mc:Fallback>
+        </mc:AlternateContent>
+        <mc:AlternateContent xmlns:mc="http://schemas.openxmlformats.org/markup-compatibility/2006" xmlns:a14="http://schemas.microsoft.com/office/drawing/2010/main">
+          <mc:Choice Requires="a14">
+            <p:sp>
+              <p:nvSpPr>
+                <p:cNvPr id="20" name="ZoneTexte 19"/>
+                <p:cNvSpPr txBox="1"/>
+                <p:nvPr/>
+              </p:nvSpPr>
+              <p:spPr>
+                <a:xfrm>
+                  <a:off x="281511" y="4113076"/>
+                  <a:ext cx="901158" cy="261610"/>
+                </a:xfrm>
+                <a:prstGeom prst="rect">
+                  <a:avLst/>
+                </a:prstGeom>
+                <a:noFill/>
+              </p:spPr>
+              <p:txBody>
+                <a:bodyPr wrap="square" rtlCol="0">
+                  <a:spAutoFit/>
+                </a:bodyPr>
+                <a:lstStyle/>
+                <a:p>
+                  <a:r>
+                    <a:rPr lang="fr-FR" sz="1100" dirty="0" smtClean="0"/>
+                    <a:t>RSG </a:t>
+                  </a:r>
+                  <a14:m>
+                    <m:oMath xmlns:m="http://schemas.openxmlformats.org/officeDocument/2006/math">
+                      <m:r>
+                        <a:rPr lang="fr-FR" sz="1100" i="1" smtClean="0">
+                          <a:latin typeface="Cambria Math"/>
+                        </a:rPr>
+                        <m:t>𝐼</m:t>
+                      </m:r>
+                    </m:oMath>
+                  </a14:m>
+                  <a:endParaRPr lang="fr-FR" sz="1100" dirty="0"/>
+                </a:p>
+              </p:txBody>
+            </p:sp>
+          </mc:Choice>
+          <mc:Fallback xmlns="">
+            <p:sp>
+              <p:nvSpPr>
+                <p:cNvPr id="166" name="ZoneTexte 165"/>
+                <p:cNvSpPr txBox="1">
+                  <a:spLocks noRot="1" noChangeAspect="1" noMove="1" noResize="1" noEditPoints="1" noAdjustHandles="1" noChangeArrowheads="1" noChangeShapeType="1" noTextEdit="1"/>
+                </p:cNvSpPr>
+                <p:nvPr/>
+              </p:nvSpPr>
+              <p:spPr>
+                <a:xfrm>
+                  <a:off x="281511" y="4113076"/>
+                  <a:ext cx="901158" cy="261610"/>
+                </a:xfrm>
+                <a:prstGeom prst="rect">
+                  <a:avLst/>
+                </a:prstGeom>
+                <a:blipFill rotWithShape="1">
+                  <a:blip r:embed="rId16"/>
+                  <a:stretch>
+                    <a:fillRect b="-16279"/>
+                  </a:stretch>
+                </a:blipFill>
+              </p:spPr>
+              <p:txBody>
+                <a:bodyPr/>
+                <a:lstStyle/>
+                <a:p>
+                  <a:r>
+                    <a:rPr lang="fr-FR">
+                      <a:noFill/>
+                    </a:rPr>
+                    <a:t> </a:t>
+                  </a:r>
+                </a:p>
+              </p:txBody>
+            </p:sp>
+          </mc:Fallback>
+        </mc:AlternateContent>
+        <mc:AlternateContent xmlns:mc="http://schemas.openxmlformats.org/markup-compatibility/2006" xmlns:a14="http://schemas.microsoft.com/office/drawing/2010/main">
+          <mc:Choice Requires="a14">
+            <p:sp>
+              <p:nvSpPr>
+                <p:cNvPr id="21" name="ZoneTexte 20"/>
+                <p:cNvSpPr txBox="1"/>
+                <p:nvPr/>
+              </p:nvSpPr>
+              <p:spPr>
+                <a:xfrm>
+                  <a:off x="502490" y="4446286"/>
+                  <a:ext cx="901158" cy="261610"/>
+                </a:xfrm>
+                <a:prstGeom prst="rect">
+                  <a:avLst/>
+                </a:prstGeom>
+                <a:noFill/>
+              </p:spPr>
+              <p:txBody>
+                <a:bodyPr wrap="square" rtlCol="0">
+                  <a:spAutoFit/>
+                </a:bodyPr>
+                <a:lstStyle/>
+                <a:p>
+                  <a:r>
+                    <a:rPr lang="fr-FR" sz="1100" dirty="0" smtClean="0"/>
+                    <a:t>RSG </a:t>
+                  </a:r>
+                  <a14:m>
+                    <m:oMath xmlns:m="http://schemas.openxmlformats.org/officeDocument/2006/math">
+                      <m:r>
+                        <a:rPr lang="fr-FR" sz="1100" b="0" i="1" smtClean="0">
+                          <a:latin typeface="Cambria Math"/>
+                        </a:rPr>
+                        <m:t>𝐽</m:t>
+                      </m:r>
+                    </m:oMath>
+                  </a14:m>
+                  <a:endParaRPr lang="fr-FR" sz="1100" dirty="0"/>
+                </a:p>
+              </p:txBody>
+            </p:sp>
+          </mc:Choice>
+          <mc:Fallback xmlns="">
+            <p:sp>
+              <p:nvSpPr>
+                <p:cNvPr id="167" name="ZoneTexte 166"/>
+                <p:cNvSpPr txBox="1">
+                  <a:spLocks noRot="1" noChangeAspect="1" noMove="1" noResize="1" noEditPoints="1" noAdjustHandles="1" noChangeArrowheads="1" noChangeShapeType="1" noTextEdit="1"/>
+                </p:cNvSpPr>
+                <p:nvPr/>
+              </p:nvSpPr>
+              <p:spPr>
+                <a:xfrm>
+                  <a:off x="502490" y="4446286"/>
+                  <a:ext cx="901158" cy="261610"/>
+                </a:xfrm>
+                <a:prstGeom prst="rect">
+                  <a:avLst/>
+                </a:prstGeom>
+                <a:blipFill rotWithShape="1">
+                  <a:blip r:embed="rId17"/>
+                  <a:stretch>
+                    <a:fillRect b="-16279"/>
+                  </a:stretch>
+                </a:blipFill>
+              </p:spPr>
+              <p:txBody>
+                <a:bodyPr/>
+                <a:lstStyle/>
+                <a:p>
+                  <a:r>
+                    <a:rPr lang="fr-FR">
+                      <a:noFill/>
+                    </a:rPr>
+                    <a:t> </a:t>
+                  </a:r>
+                </a:p>
+              </p:txBody>
+            </p:sp>
+          </mc:Fallback>
+        </mc:AlternateContent>
+      </p:grpSp>
+      <p:sp>
+        <p:nvSpPr>
+          <p:cNvPr id="22" name="Arc 21"/>
+          <p:cNvSpPr/>
+          <p:nvPr/>
+        </p:nvSpPr>
+        <p:spPr>
+          <a:xfrm>
+            <a:off x="1409257" y="2954870"/>
+            <a:ext cx="1058775" cy="760071"/>
+          </a:xfrm>
+          <a:prstGeom prst="arc">
+            <a:avLst>
+              <a:gd name="adj1" fmla="val 17089227"/>
+              <a:gd name="adj2" fmla="val 9858094"/>
+            </a:avLst>
+          </a:prstGeom>
+          <a:ln>
+            <a:solidFill>
+              <a:srgbClr val="FF0000"/>
+            </a:solidFill>
+            <a:headEnd type="stealth" w="med" len="lg"/>
+            <a:tailEnd type="stealth" w="med" len="lg"/>
+          </a:ln>
+        </p:spPr>
+        <p:style>
+          <a:lnRef idx="1">
+            <a:schemeClr val="accent1"/>
+          </a:lnRef>
+          <a:fillRef idx="0">
+            <a:schemeClr val="accent1"/>
+          </a:fillRef>
+          <a:effectRef idx="0">
+            <a:schemeClr val="accent1"/>
+          </a:effectRef>
+          <a:fontRef idx="minor">
+            <a:schemeClr val="tx1"/>
+          </a:fontRef>
+        </p:style>
+        <p:txBody>
+          <a:bodyPr rtlCol="0" anchor="ctr"/>
+          <a:lstStyle/>
+          <a:p>
+            <a:pPr algn="ctr"/>
+            <a:endParaRPr lang="fr-FR"/>
+          </a:p>
+        </p:txBody>
+      </p:sp>
+      <mc:AlternateContent xmlns:mc="http://schemas.openxmlformats.org/markup-compatibility/2006">
+        <mc:Choice xmlns:a14="http://schemas.microsoft.com/office/drawing/2010/main" Requires="a14">
+          <p:sp>
+            <p:nvSpPr>
+              <p:cNvPr id="23" name="ZoneTexte 22"/>
+              <p:cNvSpPr txBox="1"/>
+              <p:nvPr/>
+            </p:nvSpPr>
+            <p:spPr>
+              <a:xfrm>
+                <a:off x="5105045" y="2831526"/>
+                <a:ext cx="901158" cy="430887"/>
+              </a:xfrm>
+              <a:prstGeom prst="rect">
+                <a:avLst/>
+              </a:prstGeom>
+              <a:noFill/>
+            </p:spPr>
+            <p:txBody>
+              <a:bodyPr wrap="square" rtlCol="0">
+                <a:spAutoFit/>
+              </a:bodyPr>
+              <a:lstStyle/>
+              <a:p>
+                <a:r>
+                  <a:rPr lang="fr-FR" sz="1100" dirty="0" smtClean="0"/>
+                  <a:t>Pivot d’axe </a:t>
+                </a:r>
+                <a14:m>
+                  <m:oMath xmlns:m="http://schemas.openxmlformats.org/officeDocument/2006/math">
+                    <m:d>
+                      <m:dPr>
+                        <m:ctrlPr>
+                          <a:rPr lang="fr-FR" sz="1100" i="1" smtClean="0">
+                            <a:latin typeface="Cambria Math"/>
+                          </a:rPr>
+                        </m:ctrlPr>
+                      </m:dPr>
+                      <m:e>
+                        <m:r>
+                          <a:rPr lang="fr-FR" sz="1100" b="0" i="1" smtClean="0">
+                            <a:latin typeface="Cambria Math"/>
+                          </a:rPr>
+                          <m:t>𝐴</m:t>
+                        </m:r>
+                        <m:r>
+                          <a:rPr lang="fr-FR" sz="1100" b="0" i="1" smtClean="0">
+                            <a:latin typeface="Cambria Math"/>
+                          </a:rPr>
+                          <m:t>,</m:t>
+                        </m:r>
+                        <m:acc>
+                          <m:accPr>
+                            <m:chr m:val="⃗"/>
+                            <m:ctrlPr>
+                              <a:rPr lang="fr-FR" sz="1100" b="0" i="1" smtClean="0">
+                                <a:latin typeface="Cambria Math"/>
+                              </a:rPr>
+                            </m:ctrlPr>
+                          </m:accPr>
+                          <m:e>
+                            <m:r>
+                              <a:rPr lang="fr-FR" sz="1100" b="0" i="1" smtClean="0">
+                                <a:latin typeface="Cambria Math"/>
+                              </a:rPr>
+                              <m:t>𝑧</m:t>
+                            </m:r>
+                          </m:e>
+                        </m:acc>
+                      </m:e>
+                    </m:d>
+                  </m:oMath>
+                </a14:m>
+                <a:endParaRPr lang="fr-FR" sz="1100" dirty="0"/>
+              </a:p>
+            </p:txBody>
+          </p:sp>
+        </mc:Choice>
+        <mc:Fallback>
+          <p:sp>
+            <p:nvSpPr>
+              <p:cNvPr id="23" name="ZoneTexte 22"/>
+              <p:cNvSpPr txBox="1">
+                <a:spLocks noRot="1" noChangeAspect="1" noMove="1" noResize="1" noEditPoints="1" noAdjustHandles="1" noChangeArrowheads="1" noChangeShapeType="1" noTextEdit="1"/>
+              </p:cNvSpPr>
+              <p:nvPr/>
+            </p:nvSpPr>
+            <p:spPr>
+              <a:xfrm>
+                <a:off x="5105045" y="2831526"/>
+                <a:ext cx="901158" cy="430887"/>
+              </a:xfrm>
+              <a:prstGeom prst="rect">
+                <a:avLst/>
+              </a:prstGeom>
+              <a:blipFill rotWithShape="1">
+                <a:blip r:embed="rId18"/>
+                <a:stretch>
+                  <a:fillRect t="-1408"/>
+                </a:stretch>
+              </a:blipFill>
+            </p:spPr>
+            <p:txBody>
+              <a:bodyPr/>
+              <a:lstStyle/>
+              <a:p>
+                <a:r>
+                  <a:rPr lang="fr-FR">
+                    <a:noFill/>
+                  </a:rPr>
+                  <a:t> </a:t>
+                </a:r>
+              </a:p>
+            </p:txBody>
+          </p:sp>
+        </mc:Fallback>
+      </mc:AlternateContent>
+      <p:grpSp>
+        <p:nvGrpSpPr>
+          <p:cNvPr id="24" name="Groupe 23"/>
+          <p:cNvGrpSpPr/>
+          <p:nvPr/>
+        </p:nvGrpSpPr>
+        <p:grpSpPr>
+          <a:xfrm>
+            <a:off x="3948950" y="2866970"/>
+            <a:ext cx="2023572" cy="1342965"/>
+            <a:chOff x="26574" y="4030235"/>
+            <a:chExt cx="2023572" cy="1342965"/>
+          </a:xfrm>
+        </p:grpSpPr>
+        <p:sp>
+          <p:nvSpPr>
+            <p:cNvPr id="25" name="Ellipse 24"/>
+            <p:cNvSpPr/>
+            <p:nvPr/>
+          </p:nvSpPr>
+          <p:spPr>
+            <a:xfrm>
+              <a:off x="845461" y="4030235"/>
+              <a:ext cx="180000" cy="180000"/>
+            </a:xfrm>
+            <a:prstGeom prst="ellipse">
+              <a:avLst/>
+            </a:prstGeom>
+            <a:noFill/>
+            <a:ln w="12700">
+              <a:solidFill>
+                <a:srgbClr val="7030A0"/>
+              </a:solidFill>
+            </a:ln>
+          </p:spPr>
+          <p:style>
+            <a:lnRef idx="2">
+              <a:schemeClr val="accent1">
+                <a:shade val="50000"/>
+              </a:schemeClr>
+            </a:lnRef>
+            <a:fillRef idx="1">
+              <a:schemeClr val="accent1"/>
+            </a:fillRef>
+            <a:effectRef idx="0">
+              <a:schemeClr val="accent1"/>
+            </a:effectRef>
+            <a:fontRef idx="minor">
+              <a:schemeClr val="lt1"/>
+            </a:fontRef>
+          </p:style>
+          <p:txBody>
+            <a:bodyPr rtlCol="0" anchor="ctr"/>
+            <a:lstStyle/>
+            <a:p>
+              <a:pPr algn="ctr"/>
+              <a:r>
+                <a:rPr lang="fr-FR" sz="1100" dirty="0">
+                  <a:solidFill>
+                    <a:srgbClr val="7030A0"/>
+                  </a:solidFill>
+                </a:rPr>
+                <a:t>2</a:t>
+              </a:r>
+            </a:p>
+          </p:txBody>
+        </p:sp>
+        <p:sp>
+          <p:nvSpPr>
+            <p:cNvPr id="26" name="Ellipse 25"/>
+            <p:cNvSpPr/>
+            <p:nvPr/>
+          </p:nvSpPr>
+          <p:spPr>
+            <a:xfrm>
+              <a:off x="297153" y="4491128"/>
+              <a:ext cx="180000" cy="180000"/>
+            </a:xfrm>
+            <a:prstGeom prst="ellipse">
+              <a:avLst/>
+            </a:prstGeom>
+            <a:noFill/>
+            <a:ln w="12700">
+              <a:solidFill>
+                <a:srgbClr val="00B050"/>
+              </a:solidFill>
+            </a:ln>
+          </p:spPr>
+          <p:style>
+            <a:lnRef idx="2">
+              <a:schemeClr val="accent1">
+                <a:shade val="50000"/>
+              </a:schemeClr>
+            </a:lnRef>
+            <a:fillRef idx="1">
+              <a:schemeClr val="accent1"/>
+            </a:fillRef>
+            <a:effectRef idx="0">
+              <a:schemeClr val="accent1"/>
+            </a:effectRef>
+            <a:fontRef idx="minor">
+              <a:schemeClr val="lt1"/>
+            </a:fontRef>
+          </p:style>
+          <p:txBody>
+            <a:bodyPr rtlCol="0" anchor="ctr"/>
+            <a:lstStyle/>
+            <a:p>
+              <a:pPr algn="ctr"/>
+              <a:r>
+                <a:rPr lang="fr-FR" sz="1100" dirty="0" smtClean="0">
+                  <a:solidFill>
+                    <a:srgbClr val="00B050"/>
+                  </a:solidFill>
+                </a:rPr>
+                <a:t>1</a:t>
+              </a:r>
+              <a:endParaRPr lang="fr-FR" sz="1100" dirty="0">
+                <a:solidFill>
+                  <a:srgbClr val="00B050"/>
+                </a:solidFill>
+              </a:endParaRPr>
+            </a:p>
+          </p:txBody>
+        </p:sp>
+        <p:sp>
+          <p:nvSpPr>
+            <p:cNvPr id="27" name="Ellipse 26"/>
+            <p:cNvSpPr/>
+            <p:nvPr/>
+          </p:nvSpPr>
+          <p:spPr>
+            <a:xfrm>
+              <a:off x="1419567" y="4491128"/>
+              <a:ext cx="180000" cy="180000"/>
+            </a:xfrm>
+            <a:prstGeom prst="ellipse">
+              <a:avLst/>
+            </a:prstGeom>
+            <a:noFill/>
+            <a:ln w="12700">
+              <a:solidFill>
+                <a:srgbClr val="0070C0"/>
+              </a:solidFill>
+            </a:ln>
+          </p:spPr>
+          <p:style>
+            <a:lnRef idx="2">
+              <a:schemeClr val="accent1">
+                <a:shade val="50000"/>
+              </a:schemeClr>
+            </a:lnRef>
+            <a:fillRef idx="1">
+              <a:schemeClr val="accent1"/>
+            </a:fillRef>
+            <a:effectRef idx="0">
+              <a:schemeClr val="accent1"/>
+            </a:effectRef>
+            <a:fontRef idx="minor">
+              <a:schemeClr val="lt1"/>
+            </a:fontRef>
+          </p:style>
+          <p:txBody>
+            <a:bodyPr rtlCol="0" anchor="ctr"/>
+            <a:lstStyle/>
+            <a:p>
+              <a:pPr algn="ctr"/>
+              <a:r>
+                <a:rPr lang="fr-FR" sz="1100" dirty="0">
+                  <a:solidFill>
+                    <a:srgbClr val="0070C0"/>
+                  </a:solidFill>
+                </a:rPr>
+                <a:t>3</a:t>
+              </a:r>
+            </a:p>
+          </p:txBody>
+        </p:sp>
+        <p:sp>
+          <p:nvSpPr>
+            <p:cNvPr id="28" name="Ellipse 27"/>
+            <p:cNvSpPr/>
+            <p:nvPr/>
+          </p:nvSpPr>
+          <p:spPr>
+            <a:xfrm>
+              <a:off x="845576" y="4943947"/>
+              <a:ext cx="180000" cy="180000"/>
+            </a:xfrm>
+            <a:prstGeom prst="ellipse">
+              <a:avLst/>
+            </a:prstGeom>
+            <a:noFill/>
+            <a:ln w="12700">
+              <a:solidFill>
+                <a:schemeClr val="tx1"/>
+              </a:solidFill>
+            </a:ln>
+          </p:spPr>
+          <p:style>
+            <a:lnRef idx="2">
+              <a:schemeClr val="accent1">
+                <a:shade val="50000"/>
+              </a:schemeClr>
+            </a:lnRef>
+            <a:fillRef idx="1">
+              <a:schemeClr val="accent1"/>
+            </a:fillRef>
+            <a:effectRef idx="0">
+              <a:schemeClr val="accent1"/>
+            </a:effectRef>
+            <a:fontRef idx="minor">
+              <a:schemeClr val="lt1"/>
+            </a:fontRef>
+          </p:style>
+          <p:txBody>
+            <a:bodyPr rtlCol="0" anchor="ctr"/>
+            <a:lstStyle/>
+            <a:p>
+              <a:pPr algn="ctr"/>
+              <a:r>
+                <a:rPr lang="fr-FR" sz="1100" dirty="0">
+                  <a:solidFill>
+                    <a:schemeClr val="tx1"/>
+                  </a:solidFill>
+                </a:rPr>
+                <a:t>0</a:t>
+              </a:r>
+            </a:p>
+          </p:txBody>
+        </p:sp>
+        <p:sp>
+          <p:nvSpPr>
+            <p:cNvPr id="29" name="Rectangle 28"/>
+            <p:cNvSpPr/>
+            <p:nvPr/>
+          </p:nvSpPr>
+          <p:spPr>
+            <a:xfrm rot="5400000">
+              <a:off x="881576" y="5211200"/>
+              <a:ext cx="108000" cy="216000"/>
+            </a:xfrm>
+            <a:prstGeom prst="rect">
+              <a:avLst/>
+            </a:prstGeom>
+            <a:pattFill prst="dkUpDiag">
+              <a:fgClr>
+                <a:schemeClr val="tx1"/>
+              </a:fgClr>
+              <a:bgClr>
+                <a:schemeClr val="bg1"/>
+              </a:bgClr>
+            </a:pattFill>
+            <a:ln w="28575">
+              <a:noFill/>
+            </a:ln>
+          </p:spPr>
+          <p:style>
+            <a:lnRef idx="2">
+              <a:schemeClr val="accent1">
+                <a:shade val="50000"/>
+              </a:schemeClr>
+            </a:lnRef>
+            <a:fillRef idx="1">
+              <a:schemeClr val="accent1"/>
+            </a:fillRef>
+            <a:effectRef idx="0">
+              <a:schemeClr val="accent1"/>
+            </a:effectRef>
+            <a:fontRef idx="minor">
+              <a:schemeClr val="lt1"/>
+            </a:fontRef>
+          </p:style>
+          <p:txBody>
+            <a:bodyPr rtlCol="0" anchor="ctr"/>
+            <a:lstStyle/>
+            <a:p>
+              <a:pPr algn="ctr"/>
+              <a:endParaRPr lang="fr-FR"/>
+            </a:p>
+          </p:txBody>
+        </p:sp>
+        <p:cxnSp>
+          <p:nvCxnSpPr>
+            <p:cNvPr id="30" name="Connecteur droit 29"/>
+            <p:cNvCxnSpPr/>
+            <p:nvPr/>
+          </p:nvCxnSpPr>
+          <p:spPr>
+            <a:xfrm>
+              <a:off x="827461" y="5271459"/>
+              <a:ext cx="216000" cy="0"/>
+            </a:xfrm>
+            <a:prstGeom prst="line">
+              <a:avLst/>
+            </a:prstGeom>
+            <a:ln w="19050">
+              <a:solidFill>
+                <a:schemeClr val="tx1"/>
+              </a:solidFill>
+            </a:ln>
+          </p:spPr>
+          <p:style>
+            <a:lnRef idx="1">
+              <a:schemeClr val="accent1"/>
+            </a:lnRef>
+            <a:fillRef idx="0">
+              <a:schemeClr val="accent1"/>
+            </a:fillRef>
+            <a:effectRef idx="0">
+              <a:schemeClr val="accent1"/>
+            </a:effectRef>
+            <a:fontRef idx="minor">
+              <a:schemeClr val="tx1"/>
+            </a:fontRef>
+          </p:style>
+        </p:cxnSp>
+        <p:cxnSp>
+          <p:nvCxnSpPr>
+            <p:cNvPr id="31" name="Connecteur droit 30"/>
+            <p:cNvCxnSpPr/>
+            <p:nvPr/>
+          </p:nvCxnSpPr>
+          <p:spPr>
+            <a:xfrm>
+              <a:off x="935461" y="5127443"/>
+              <a:ext cx="0" cy="144016"/>
+            </a:xfrm>
+            <a:prstGeom prst="line">
+              <a:avLst/>
+            </a:prstGeom>
+            <a:ln w="19050">
+              <a:solidFill>
+                <a:schemeClr val="tx1"/>
+              </a:solidFill>
+            </a:ln>
+          </p:spPr>
+          <p:style>
+            <a:lnRef idx="1">
+              <a:schemeClr val="accent1"/>
+            </a:lnRef>
+            <a:fillRef idx="0">
+              <a:schemeClr val="accent1"/>
+            </a:fillRef>
+            <a:effectRef idx="0">
+              <a:schemeClr val="accent1"/>
+            </a:effectRef>
+            <a:fontRef idx="minor">
+              <a:schemeClr val="tx1"/>
+            </a:fontRef>
+          </p:style>
+        </p:cxnSp>
+        <p:cxnSp>
+          <p:nvCxnSpPr>
+            <p:cNvPr id="32" name="Connecteur droit 31"/>
+            <p:cNvCxnSpPr>
+              <a:stCxn id="28" idx="1"/>
+              <a:endCxn id="26" idx="5"/>
+            </p:cNvCxnSpPr>
+            <p:nvPr/>
+          </p:nvCxnSpPr>
+          <p:spPr>
+            <a:xfrm flipH="1" flipV="1">
+              <a:off x="450793" y="4644768"/>
+              <a:ext cx="421143" cy="325539"/>
+            </a:xfrm>
+            <a:prstGeom prst="line">
+              <a:avLst/>
+            </a:prstGeom>
+            <a:ln w="19050">
+              <a:solidFill>
+                <a:schemeClr val="tx1"/>
+              </a:solidFill>
+            </a:ln>
+          </p:spPr>
+          <p:style>
+            <a:lnRef idx="1">
+              <a:schemeClr val="accent1"/>
+            </a:lnRef>
+            <a:fillRef idx="0">
+              <a:schemeClr val="accent1"/>
+            </a:fillRef>
+            <a:effectRef idx="0">
+              <a:schemeClr val="accent1"/>
+            </a:effectRef>
+            <a:fontRef idx="minor">
+              <a:schemeClr val="tx1"/>
+            </a:fontRef>
+          </p:style>
+        </p:cxnSp>
+        <p:cxnSp>
+          <p:nvCxnSpPr>
+            <p:cNvPr id="33" name="Connecteur droit 32"/>
+            <p:cNvCxnSpPr>
+              <a:stCxn id="25" idx="3"/>
+              <a:endCxn id="26" idx="7"/>
+            </p:cNvCxnSpPr>
+            <p:nvPr/>
+          </p:nvCxnSpPr>
+          <p:spPr>
+            <a:xfrm flipH="1">
+              <a:off x="450793" y="4183875"/>
+              <a:ext cx="421028" cy="333613"/>
+            </a:xfrm>
+            <a:prstGeom prst="line">
+              <a:avLst/>
+            </a:prstGeom>
+            <a:ln w="19050">
+              <a:solidFill>
+                <a:schemeClr val="tx1"/>
+              </a:solidFill>
+            </a:ln>
+          </p:spPr>
+          <p:style>
+            <a:lnRef idx="1">
+              <a:schemeClr val="accent1"/>
+            </a:lnRef>
+            <a:fillRef idx="0">
+              <a:schemeClr val="accent1"/>
+            </a:fillRef>
+            <a:effectRef idx="0">
+              <a:schemeClr val="accent1"/>
+            </a:effectRef>
+            <a:fontRef idx="minor">
+              <a:schemeClr val="tx1"/>
+            </a:fontRef>
+          </p:style>
+        </p:cxnSp>
+        <p:cxnSp>
+          <p:nvCxnSpPr>
+            <p:cNvPr id="34" name="Connecteur droit 33"/>
+            <p:cNvCxnSpPr>
+              <a:stCxn id="27" idx="3"/>
+              <a:endCxn id="28" idx="7"/>
+            </p:cNvCxnSpPr>
+            <p:nvPr/>
+          </p:nvCxnSpPr>
+          <p:spPr>
+            <a:xfrm flipH="1">
+              <a:off x="999216" y="4644768"/>
+              <a:ext cx="446711" cy="325539"/>
+            </a:xfrm>
+            <a:prstGeom prst="line">
+              <a:avLst/>
+            </a:prstGeom>
+            <a:ln w="19050">
+              <a:solidFill>
+                <a:schemeClr val="tx1"/>
+              </a:solidFill>
+            </a:ln>
+          </p:spPr>
+          <p:style>
+            <a:lnRef idx="1">
+              <a:schemeClr val="accent1"/>
+            </a:lnRef>
+            <a:fillRef idx="0">
+              <a:schemeClr val="accent1"/>
+            </a:fillRef>
+            <a:effectRef idx="0">
+              <a:schemeClr val="accent1"/>
+            </a:effectRef>
+            <a:fontRef idx="minor">
+              <a:schemeClr val="tx1"/>
+            </a:fontRef>
+          </p:style>
+        </p:cxnSp>
+        <p:cxnSp>
+          <p:nvCxnSpPr>
+            <p:cNvPr id="35" name="Connecteur droit 34"/>
+            <p:cNvCxnSpPr>
+              <a:stCxn id="25" idx="5"/>
+              <a:endCxn id="27" idx="1"/>
+            </p:cNvCxnSpPr>
+            <p:nvPr/>
+          </p:nvCxnSpPr>
+          <p:spPr>
+            <a:xfrm>
+              <a:off x="999101" y="4183875"/>
+              <a:ext cx="446826" cy="333613"/>
+            </a:xfrm>
+            <a:prstGeom prst="line">
+              <a:avLst/>
+            </a:prstGeom>
+            <a:ln w="19050">
+              <a:solidFill>
+                <a:schemeClr val="tx1"/>
+              </a:solidFill>
+            </a:ln>
+          </p:spPr>
+          <p:style>
+            <a:lnRef idx="1">
+              <a:schemeClr val="accent1"/>
+            </a:lnRef>
+            <a:fillRef idx="0">
+              <a:schemeClr val="accent1"/>
+            </a:fillRef>
+            <a:effectRef idx="0">
+              <a:schemeClr val="accent1"/>
+            </a:effectRef>
+            <a:fontRef idx="minor">
+              <a:schemeClr val="tx1"/>
+            </a:fontRef>
+          </p:style>
+        </p:cxnSp>
+        <p:cxnSp>
+          <p:nvCxnSpPr>
+            <p:cNvPr id="36" name="Connecteur droit 35"/>
+            <p:cNvCxnSpPr>
+              <a:stCxn id="25" idx="4"/>
+              <a:endCxn id="28" idx="0"/>
+            </p:cNvCxnSpPr>
+            <p:nvPr/>
+          </p:nvCxnSpPr>
+          <p:spPr>
+            <a:xfrm>
+              <a:off x="935461" y="4210235"/>
+              <a:ext cx="115" cy="733712"/>
+            </a:xfrm>
+            <a:prstGeom prst="line">
+              <a:avLst/>
+            </a:prstGeom>
+            <a:ln w="19050">
+              <a:solidFill>
+                <a:schemeClr val="tx1"/>
+              </a:solidFill>
+            </a:ln>
+          </p:spPr>
+          <p:style>
+            <a:lnRef idx="1">
+              <a:schemeClr val="accent1"/>
+            </a:lnRef>
+            <a:fillRef idx="0">
+              <a:schemeClr val="accent1"/>
+            </a:fillRef>
+            <a:effectRef idx="0">
+              <a:schemeClr val="accent1"/>
+            </a:effectRef>
+            <a:fontRef idx="minor">
+              <a:schemeClr val="tx1"/>
+            </a:fontRef>
+          </p:style>
+        </p:cxnSp>
+        <mc:AlternateContent xmlns:mc="http://schemas.openxmlformats.org/markup-compatibility/2006" xmlns:a14="http://schemas.microsoft.com/office/drawing/2010/main">
+          <mc:Choice Requires="a14">
+            <p:sp>
+              <p:nvSpPr>
+                <p:cNvPr id="37" name="ZoneTexte 36"/>
+                <p:cNvSpPr txBox="1"/>
+                <p:nvPr/>
+              </p:nvSpPr>
+              <p:spPr>
+                <a:xfrm>
+                  <a:off x="26574" y="4768564"/>
+                  <a:ext cx="901158" cy="430887"/>
+                </a:xfrm>
+                <a:prstGeom prst="rect">
+                  <a:avLst/>
+                </a:prstGeom>
+                <a:noFill/>
+              </p:spPr>
+              <p:txBody>
+                <a:bodyPr wrap="square" rtlCol="0">
+                  <a:spAutoFit/>
+                </a:bodyPr>
+                <a:lstStyle/>
+                <a:p>
+                  <a:r>
+                    <a:rPr lang="fr-FR" sz="1100" dirty="0" smtClean="0"/>
+                    <a:t>Pivot d’axe </a:t>
+                  </a:r>
+                  <a14:m>
+                    <m:oMath xmlns:m="http://schemas.openxmlformats.org/officeDocument/2006/math">
+                      <m:d>
+                        <m:dPr>
+                          <m:ctrlPr>
+                            <a:rPr lang="fr-FR" sz="1100" i="1" smtClean="0">
+                              <a:latin typeface="Cambria Math"/>
+                            </a:rPr>
+                          </m:ctrlPr>
+                        </m:dPr>
+                        <m:e>
+                          <m:r>
+                            <a:rPr lang="fr-FR" sz="1100" b="0" i="1" smtClean="0">
+                              <a:latin typeface="Cambria Math"/>
+                            </a:rPr>
+                            <m:t>𝑂</m:t>
+                          </m:r>
+                          <m:r>
+                            <a:rPr lang="fr-FR" sz="1100" b="0" i="1" smtClean="0">
+                              <a:latin typeface="Cambria Math"/>
+                            </a:rPr>
+                            <m:t>,</m:t>
+                          </m:r>
+                          <m:acc>
+                            <m:accPr>
+                              <m:chr m:val="⃗"/>
+                              <m:ctrlPr>
+                                <a:rPr lang="fr-FR" sz="1100" b="0" i="1" smtClean="0">
+                                  <a:latin typeface="Cambria Math"/>
+                                </a:rPr>
+                              </m:ctrlPr>
+                            </m:accPr>
+                            <m:e>
+                              <m:r>
+                                <a:rPr lang="fr-FR" sz="1100" b="0" i="1" smtClean="0">
+                                  <a:latin typeface="Cambria Math"/>
+                                </a:rPr>
+                                <m:t>𝑧</m:t>
+                              </m:r>
+                            </m:e>
+                          </m:acc>
+                        </m:e>
+                      </m:d>
+                    </m:oMath>
+                  </a14:m>
+                  <a:endParaRPr lang="fr-FR" sz="1100" dirty="0"/>
+                </a:p>
+              </p:txBody>
+            </p:sp>
+          </mc:Choice>
+          <mc:Fallback xmlns="">
+            <p:sp>
+              <p:nvSpPr>
+                <p:cNvPr id="1054" name="ZoneTexte 1053"/>
+                <p:cNvSpPr txBox="1">
+                  <a:spLocks noRot="1" noChangeAspect="1" noMove="1" noResize="1" noEditPoints="1" noAdjustHandles="1" noChangeArrowheads="1" noChangeShapeType="1" noTextEdit="1"/>
+                </p:cNvSpPr>
+                <p:nvPr/>
+              </p:nvSpPr>
+              <p:spPr>
+                <a:xfrm>
+                  <a:off x="26574" y="4768564"/>
+                  <a:ext cx="901158" cy="430887"/>
+                </a:xfrm>
+                <a:prstGeom prst="rect">
+                  <a:avLst/>
+                </a:prstGeom>
+                <a:blipFill rotWithShape="1">
+                  <a:blip r:embed="rId14"/>
+                  <a:stretch>
+                    <a:fillRect t="-1408"/>
+                  </a:stretch>
+                </a:blipFill>
+              </p:spPr>
+              <p:txBody>
+                <a:bodyPr/>
+                <a:lstStyle/>
+                <a:p>
+                  <a:r>
+                    <a:rPr lang="fr-FR">
+                      <a:noFill/>
+                    </a:rPr>
+                    <a:t> </a:t>
+                  </a:r>
+                </a:p>
+              </p:txBody>
+            </p:sp>
+          </mc:Fallback>
+        </mc:AlternateContent>
+        <mc:AlternateContent xmlns:mc="http://schemas.openxmlformats.org/markup-compatibility/2006" xmlns:a14="http://schemas.microsoft.com/office/drawing/2010/main">
+          <mc:Choice Requires="a14">
+            <p:sp>
+              <p:nvSpPr>
+                <p:cNvPr id="38" name="ZoneTexte 37"/>
+                <p:cNvSpPr txBox="1"/>
+                <p:nvPr/>
+              </p:nvSpPr>
+              <p:spPr>
+                <a:xfrm>
+                  <a:off x="1148988" y="4768564"/>
+                  <a:ext cx="901158" cy="430887"/>
+                </a:xfrm>
+                <a:prstGeom prst="rect">
+                  <a:avLst/>
+                </a:prstGeom>
+                <a:noFill/>
+              </p:spPr>
+              <p:txBody>
+                <a:bodyPr wrap="square" rtlCol="0">
+                  <a:spAutoFit/>
+                </a:bodyPr>
+                <a:lstStyle/>
+                <a:p>
+                  <a:r>
+                    <a:rPr lang="fr-FR" sz="1100" dirty="0" smtClean="0"/>
+                    <a:t>Pivot d’axe </a:t>
+                  </a:r>
+                  <a14:m>
+                    <m:oMath xmlns:m="http://schemas.openxmlformats.org/officeDocument/2006/math">
+                      <m:d>
+                        <m:dPr>
+                          <m:ctrlPr>
+                            <a:rPr lang="fr-FR" sz="1100" i="1" smtClean="0">
+                              <a:latin typeface="Cambria Math"/>
+                            </a:rPr>
+                          </m:ctrlPr>
+                        </m:dPr>
+                        <m:e>
+                          <m:r>
+                            <a:rPr lang="fr-FR" sz="1100" b="0" i="1" smtClean="0">
+                              <a:latin typeface="Cambria Math"/>
+                            </a:rPr>
+                            <m:t>𝑂</m:t>
+                          </m:r>
+                          <m:r>
+                            <a:rPr lang="fr-FR" sz="1100" b="0" i="1" smtClean="0">
+                              <a:latin typeface="Cambria Math"/>
+                            </a:rPr>
+                            <m:t>,</m:t>
+                          </m:r>
+                          <m:acc>
+                            <m:accPr>
+                              <m:chr m:val="⃗"/>
+                              <m:ctrlPr>
+                                <a:rPr lang="fr-FR" sz="1100" b="0" i="1" smtClean="0">
+                                  <a:latin typeface="Cambria Math"/>
+                                </a:rPr>
+                              </m:ctrlPr>
+                            </m:accPr>
+                            <m:e>
+                              <m:r>
+                                <a:rPr lang="fr-FR" sz="1100" b="0" i="1" smtClean="0">
+                                  <a:latin typeface="Cambria Math"/>
+                                </a:rPr>
+                                <m:t>𝑧</m:t>
+                              </m:r>
+                            </m:e>
+                          </m:acc>
+                        </m:e>
+                      </m:d>
+                    </m:oMath>
+                  </a14:m>
+                  <a:endParaRPr lang="fr-FR" sz="1100" dirty="0"/>
+                </a:p>
+              </p:txBody>
+            </p:sp>
+          </mc:Choice>
+          <mc:Fallback xmlns="">
+            <p:sp>
+              <p:nvSpPr>
+                <p:cNvPr id="164" name="ZoneTexte 163"/>
+                <p:cNvSpPr txBox="1">
+                  <a:spLocks noRot="1" noChangeAspect="1" noMove="1" noResize="1" noEditPoints="1" noAdjustHandles="1" noChangeArrowheads="1" noChangeShapeType="1" noTextEdit="1"/>
+                </p:cNvSpPr>
+                <p:nvPr/>
+              </p:nvSpPr>
+              <p:spPr>
+                <a:xfrm>
+                  <a:off x="1148988" y="4768564"/>
+                  <a:ext cx="901158" cy="430887"/>
+                </a:xfrm>
+                <a:prstGeom prst="rect">
+                  <a:avLst/>
+                </a:prstGeom>
+                <a:blipFill rotWithShape="1">
+                  <a:blip r:embed="rId15"/>
+                  <a:stretch>
+                    <a:fillRect t="-1408"/>
+                  </a:stretch>
+                </a:blipFill>
+              </p:spPr>
+              <p:txBody>
+                <a:bodyPr/>
+                <a:lstStyle/>
+                <a:p>
+                  <a:r>
+                    <a:rPr lang="fr-FR">
+                      <a:noFill/>
+                    </a:rPr>
+                    <a:t> </a:t>
+                  </a:r>
+                </a:p>
+              </p:txBody>
+            </p:sp>
+          </mc:Fallback>
+        </mc:AlternateContent>
+        <mc:AlternateContent xmlns:mc="http://schemas.openxmlformats.org/markup-compatibility/2006" xmlns:a14="http://schemas.microsoft.com/office/drawing/2010/main">
+          <mc:Choice Requires="a14">
+            <p:sp>
+              <p:nvSpPr>
+                <p:cNvPr id="39" name="ZoneTexte 38"/>
+                <p:cNvSpPr txBox="1"/>
+                <p:nvPr/>
+              </p:nvSpPr>
+              <p:spPr>
+                <a:xfrm>
+                  <a:off x="281511" y="4113076"/>
+                  <a:ext cx="901158" cy="261610"/>
+                </a:xfrm>
+                <a:prstGeom prst="rect">
+                  <a:avLst/>
+                </a:prstGeom>
+                <a:noFill/>
+              </p:spPr>
+              <p:txBody>
+                <a:bodyPr wrap="square" rtlCol="0">
+                  <a:spAutoFit/>
+                </a:bodyPr>
+                <a:lstStyle/>
+                <a:p>
+                  <a:r>
+                    <a:rPr lang="fr-FR" sz="1100" dirty="0" smtClean="0"/>
+                    <a:t>RSG </a:t>
+                  </a:r>
+                  <a14:m>
+                    <m:oMath xmlns:m="http://schemas.openxmlformats.org/officeDocument/2006/math">
+                      <m:r>
+                        <a:rPr lang="fr-FR" sz="1100" i="1" smtClean="0">
+                          <a:latin typeface="Cambria Math"/>
+                        </a:rPr>
+                        <m:t>𝐼</m:t>
+                      </m:r>
+                    </m:oMath>
+                  </a14:m>
+                  <a:endParaRPr lang="fr-FR" sz="1100" dirty="0"/>
+                </a:p>
+              </p:txBody>
+            </p:sp>
+          </mc:Choice>
+          <mc:Fallback xmlns="">
+            <p:sp>
+              <p:nvSpPr>
+                <p:cNvPr id="166" name="ZoneTexte 165"/>
+                <p:cNvSpPr txBox="1">
+                  <a:spLocks noRot="1" noChangeAspect="1" noMove="1" noResize="1" noEditPoints="1" noAdjustHandles="1" noChangeArrowheads="1" noChangeShapeType="1" noTextEdit="1"/>
+                </p:cNvSpPr>
+                <p:nvPr/>
+              </p:nvSpPr>
+              <p:spPr>
+                <a:xfrm>
+                  <a:off x="281511" y="4113076"/>
+                  <a:ext cx="901158" cy="261610"/>
+                </a:xfrm>
+                <a:prstGeom prst="rect">
+                  <a:avLst/>
+                </a:prstGeom>
+                <a:blipFill rotWithShape="1">
+                  <a:blip r:embed="rId16"/>
+                  <a:stretch>
+                    <a:fillRect b="-16279"/>
+                  </a:stretch>
+                </a:blipFill>
+              </p:spPr>
+              <p:txBody>
+                <a:bodyPr/>
+                <a:lstStyle/>
+                <a:p>
+                  <a:r>
+                    <a:rPr lang="fr-FR">
+                      <a:noFill/>
+                    </a:rPr>
+                    <a:t> </a:t>
+                  </a:r>
+                </a:p>
+              </p:txBody>
+            </p:sp>
+          </mc:Fallback>
+        </mc:AlternateContent>
+        <mc:AlternateContent xmlns:mc="http://schemas.openxmlformats.org/markup-compatibility/2006" xmlns:a14="http://schemas.microsoft.com/office/drawing/2010/main">
+          <mc:Choice Requires="a14">
+            <p:sp>
+              <p:nvSpPr>
+                <p:cNvPr id="40" name="ZoneTexte 39"/>
+                <p:cNvSpPr txBox="1"/>
+                <p:nvPr/>
+              </p:nvSpPr>
+              <p:spPr>
+                <a:xfrm>
+                  <a:off x="502490" y="4446286"/>
+                  <a:ext cx="901158" cy="261610"/>
+                </a:xfrm>
+                <a:prstGeom prst="rect">
+                  <a:avLst/>
+                </a:prstGeom>
+                <a:noFill/>
+              </p:spPr>
+              <p:txBody>
+                <a:bodyPr wrap="square" rtlCol="0">
+                  <a:spAutoFit/>
+                </a:bodyPr>
+                <a:lstStyle/>
+                <a:p>
+                  <a:r>
+                    <a:rPr lang="fr-FR" sz="1100" dirty="0" smtClean="0"/>
+                    <a:t>RSG </a:t>
+                  </a:r>
+                  <a14:m>
+                    <m:oMath xmlns:m="http://schemas.openxmlformats.org/officeDocument/2006/math">
+                      <m:r>
+                        <a:rPr lang="fr-FR" sz="1100" b="0" i="1" smtClean="0">
+                          <a:latin typeface="Cambria Math"/>
+                        </a:rPr>
+                        <m:t>𝐽</m:t>
+                      </m:r>
+                    </m:oMath>
+                  </a14:m>
+                  <a:endParaRPr lang="fr-FR" sz="1100" dirty="0"/>
+                </a:p>
+              </p:txBody>
+            </p:sp>
+          </mc:Choice>
+          <mc:Fallback xmlns="">
+            <p:sp>
+              <p:nvSpPr>
+                <p:cNvPr id="167" name="ZoneTexte 166"/>
+                <p:cNvSpPr txBox="1">
+                  <a:spLocks noRot="1" noChangeAspect="1" noMove="1" noResize="1" noEditPoints="1" noAdjustHandles="1" noChangeArrowheads="1" noChangeShapeType="1" noTextEdit="1"/>
+                </p:cNvSpPr>
+                <p:nvPr/>
+              </p:nvSpPr>
+              <p:spPr>
+                <a:xfrm>
+                  <a:off x="502490" y="4446286"/>
+                  <a:ext cx="901158" cy="261610"/>
+                </a:xfrm>
+                <a:prstGeom prst="rect">
+                  <a:avLst/>
+                </a:prstGeom>
+                <a:blipFill rotWithShape="1">
+                  <a:blip r:embed="rId17"/>
+                  <a:stretch>
+                    <a:fillRect b="-16279"/>
+                  </a:stretch>
+                </a:blipFill>
+              </p:spPr>
+              <p:txBody>
+                <a:bodyPr/>
+                <a:lstStyle/>
+                <a:p>
+                  <a:r>
+                    <a:rPr lang="fr-FR">
+                      <a:noFill/>
+                    </a:rPr>
+                    <a:t> </a:t>
+                  </a:r>
+                </a:p>
+              </p:txBody>
+            </p:sp>
+          </mc:Fallback>
+        </mc:AlternateContent>
+      </p:grpSp>
+      <p:sp>
+        <p:nvSpPr>
+          <p:cNvPr id="41" name="Arc 40"/>
+          <p:cNvSpPr/>
+          <p:nvPr/>
+        </p:nvSpPr>
+        <p:spPr>
+          <a:xfrm>
+            <a:off x="4309529" y="3020610"/>
+            <a:ext cx="1058775" cy="786432"/>
+          </a:xfrm>
+          <a:prstGeom prst="arc">
+            <a:avLst>
+              <a:gd name="adj1" fmla="val 17089227"/>
+              <a:gd name="adj2" fmla="val 4591650"/>
+            </a:avLst>
+          </a:prstGeom>
+          <a:ln>
+            <a:solidFill>
+              <a:srgbClr val="FF0000"/>
+            </a:solidFill>
+            <a:headEnd type="stealth" w="med" len="lg"/>
+            <a:tailEnd type="stealth" w="med" len="lg"/>
+          </a:ln>
+        </p:spPr>
+        <p:style>
+          <a:lnRef idx="1">
+            <a:schemeClr val="accent1"/>
+          </a:lnRef>
+          <a:fillRef idx="0">
+            <a:schemeClr val="accent1"/>
+          </a:fillRef>
+          <a:effectRef idx="0">
+            <a:schemeClr val="accent1"/>
+          </a:effectRef>
+          <a:fontRef idx="minor">
+            <a:schemeClr val="tx1"/>
+          </a:fontRef>
+        </p:style>
+        <p:txBody>
+          <a:bodyPr rtlCol="0" anchor="ctr"/>
+          <a:lstStyle/>
+          <a:p>
+            <a:pPr algn="ctr"/>
+            <a:endParaRPr lang="fr-FR"/>
+          </a:p>
+        </p:txBody>
+      </p:sp>
+    </p:spTree>
+    <p:extLst>
+      <p:ext uri="{BB962C8B-B14F-4D97-AF65-F5344CB8AC3E}">
+        <p14:creationId xmlns:p14="http://schemas.microsoft.com/office/powerpoint/2010/main" val="2490387428"/>
       </p:ext>
     </p:extLst>
   </p:cSld>

</xml_diff>